<commit_message>
final paper fineished and slide made
</commit_message>
<xml_diff>
--- a/mifinalpaper/LandyBrian_poster_GeneratingNewBuildingImagesUsingDCGANS.pptx
+++ b/mifinalpaper/LandyBrian_poster_GeneratingNewBuildingImagesUsingDCGANS.pptx
@@ -258,7 +258,7 @@
               <a:pPr>
                 <a:defRPr/>
               </a:pPr>
-              <a:t>12/4/2019</a:t>
+              <a:t>12/6/19</a:t>
             </a:fld>
             <a:endParaRPr lang="en-US" altLang="en-US"/>
           </a:p>
@@ -672,7 +672,7 @@
                 <a:spcPct val="0"/>
               </a:spcBef>
             </a:pPr>
-            <a:endParaRPr lang="en-US" altLang="en-US"/>
+            <a:endParaRPr lang="en-US" altLang="en-US" dirty="0"/>
           </a:p>
         </p:txBody>
       </p:sp>
@@ -1057,7 +1057,7 @@
               <a:pPr>
                 <a:defRPr/>
               </a:pPr>
-              <a:t>12/4/2019</a:t>
+              <a:t>12/6/19</a:t>
             </a:fld>
             <a:endParaRPr lang="en-US" altLang="en-US"/>
           </a:p>
@@ -1252,7 +1252,7 @@
               <a:pPr>
                 <a:defRPr/>
               </a:pPr>
-              <a:t>12/4/2019</a:t>
+              <a:t>12/6/19</a:t>
             </a:fld>
             <a:endParaRPr lang="en-US" altLang="en-US"/>
           </a:p>
@@ -1457,7 +1457,7 @@
               <a:pPr>
                 <a:defRPr/>
               </a:pPr>
-              <a:t>12/4/2019</a:t>
+              <a:t>12/6/19</a:t>
             </a:fld>
             <a:endParaRPr lang="en-US" altLang="en-US"/>
           </a:p>
@@ -1652,7 +1652,7 @@
               <a:pPr>
                 <a:defRPr/>
               </a:pPr>
-              <a:t>12/4/2019</a:t>
+              <a:t>12/6/19</a:t>
             </a:fld>
             <a:endParaRPr lang="en-US" altLang="en-US"/>
           </a:p>
@@ -1924,7 +1924,7 @@
               <a:pPr>
                 <a:defRPr/>
               </a:pPr>
-              <a:t>12/4/2019</a:t>
+              <a:t>12/6/19</a:t>
             </a:fld>
             <a:endParaRPr lang="en-US" altLang="en-US"/>
           </a:p>
@@ -2236,7 +2236,7 @@
               <a:pPr>
                 <a:defRPr/>
               </a:pPr>
-              <a:t>12/4/2019</a:t>
+              <a:t>12/6/19</a:t>
             </a:fld>
             <a:endParaRPr lang="en-US" altLang="en-US"/>
           </a:p>
@@ -2728,7 +2728,7 @@
               <a:pPr>
                 <a:defRPr/>
               </a:pPr>
-              <a:t>12/4/2019</a:t>
+              <a:t>12/6/19</a:t>
             </a:fld>
             <a:endParaRPr lang="en-US" altLang="en-US"/>
           </a:p>
@@ -2850,7 +2850,7 @@
               <a:pPr>
                 <a:defRPr/>
               </a:pPr>
-              <a:t>12/4/2019</a:t>
+              <a:t>12/6/19</a:t>
             </a:fld>
             <a:endParaRPr lang="en-US" altLang="en-US"/>
           </a:p>
@@ -3152,7 +3152,7 @@
               <a:pPr>
                 <a:defRPr/>
               </a:pPr>
-              <a:t>12/4/2019</a:t>
+              <a:t>12/6/19</a:t>
             </a:fld>
             <a:endParaRPr lang="en-US" altLang="en-US"/>
           </a:p>
@@ -3434,7 +3434,7 @@
               <a:pPr>
                 <a:defRPr/>
               </a:pPr>
-              <a:t>12/4/2019</a:t>
+              <a:t>12/6/19</a:t>
             </a:fld>
             <a:endParaRPr lang="en-US" altLang="en-US"/>
           </a:p>
@@ -3725,7 +3725,7 @@
               <a:pPr>
                 <a:defRPr/>
               </a:pPr>
-              <a:t>12/4/2019</a:t>
+              <a:t>12/6/19</a:t>
             </a:fld>
             <a:endParaRPr lang="en-US" altLang="en-US"/>
           </a:p>
@@ -4273,7 +4273,7 @@
         </p:nvCxnSpPr>
         <p:spPr>
           <a:xfrm>
-            <a:off x="15849600" y="8458200"/>
+            <a:off x="15613706" y="11963400"/>
             <a:ext cx="23164800" cy="0"/>
           </a:xfrm>
           <a:prstGeom prst="line">
@@ -4338,7 +4338,7 @@
                 <a:latin typeface="Arial" panose="020B0604020202020204" pitchFamily="34" charset="0"/>
                 <a:cs typeface="Arial" panose="020B0604020202020204" pitchFamily="34" charset="0"/>
               </a:rPr>
-              <a:t>Brian Landy, MS Computer Engineering, Rochester Institute of Technology</a:t>
+              <a:t>Brian Landy, BS/MS Computer Engineering, Rochester Institute of Technology</a:t>
             </a:r>
             <a:endParaRPr lang="en-US" altLang="en-US" sz="6600" dirty="0">
               <a:latin typeface="Arial" panose="020B0604020202020204" pitchFamily="34" charset="0"/>
@@ -4359,8 +4359,8 @@
         </p:nvSpPr>
         <p:spPr>
           <a:xfrm>
-            <a:off x="1060453" y="3001171"/>
-            <a:ext cx="13415962" cy="17441862"/>
+            <a:off x="1009884" y="4546669"/>
+            <a:ext cx="13466531" cy="16560732"/>
           </a:xfrm>
         </p:spPr>
         <p:txBody>
@@ -4385,7 +4385,7 @@
                 <a:latin typeface="Arial" panose="020B0604020202020204" pitchFamily="34" charset="0"/>
                 <a:cs typeface="Arial" panose="020B0604020202020204" pitchFamily="34" charset="0"/>
               </a:rPr>
-              <a:t>DCGANS:</a:t>
+              <a:t>DCGANS/GANS:</a:t>
             </a:r>
           </a:p>
           <a:p>
@@ -4416,8 +4416,8 @@
         </p:nvSpPr>
         <p:spPr>
           <a:xfrm>
-            <a:off x="15560677" y="3001171"/>
-            <a:ext cx="22393270" cy="7129462"/>
+            <a:off x="15560677" y="5075441"/>
+            <a:ext cx="22393270" cy="4463047"/>
           </a:xfrm>
         </p:spPr>
         <p:txBody>
@@ -4442,7 +4442,7 @@
                 <a:latin typeface="Arial" panose="020B0604020202020204" pitchFamily="34" charset="0"/>
                 <a:cs typeface="Arial" panose="020B0604020202020204" pitchFamily="34" charset="0"/>
               </a:rPr>
-              <a:t>Results:</a:t>
+              <a:t>Data Sets Evaluated with Baseline:</a:t>
             </a:r>
           </a:p>
           <a:p>
@@ -4480,8 +4480,8 @@
         </p:nvSpPr>
         <p:spPr>
           <a:xfrm>
-            <a:off x="15560677" y="12438491"/>
-            <a:ext cx="22393270" cy="9186862"/>
+            <a:off x="15613706" y="12386382"/>
+            <a:ext cx="23400694" cy="5963021"/>
           </a:xfrm>
         </p:spPr>
         <p:txBody>
@@ -4511,66 +4511,6 @@
               </a:rPr>
               <a:t>The Parameters and Results:</a:t>
             </a:r>
-          </a:p>
-          <a:p>
-            <a:pPr marL="565150" lvl="1" indent="-565150" defTabSz="2033588" eaLnBrk="1" hangingPunct="1">
-              <a:buFont typeface="Wingdings" panose="05000000000000000000" pitchFamily="2" charset="2"/>
-              <a:buChar char="Ø"/>
-              <a:defRPr/>
-            </a:pPr>
-            <a:r>
-              <a:rPr lang="en-US" altLang="en-US" sz="4800" dirty="0">
-                <a:solidFill>
-                  <a:srgbClr val="000000"/>
-                </a:solidFill>
-                <a:latin typeface="Arial" panose="020B0604020202020204" pitchFamily="34" charset="0"/>
-                <a:cs typeface="Arial" panose="020B0604020202020204" pitchFamily="34" charset="0"/>
-              </a:rPr>
-              <a:t>What model changes led to the best success?</a:t>
-            </a:r>
-          </a:p>
-          <a:p>
-            <a:pPr marL="565150" lvl="1" indent="-565150" defTabSz="2033588" eaLnBrk="1" hangingPunct="1">
-              <a:buFont typeface="Wingdings" panose="05000000000000000000" pitchFamily="2" charset="2"/>
-              <a:buChar char="Ø"/>
-              <a:defRPr/>
-            </a:pPr>
-            <a:r>
-              <a:rPr lang="en-US" altLang="ja-JP" sz="4800" dirty="0">
-                <a:solidFill>
-                  <a:srgbClr val="000000"/>
-                </a:solidFill>
-                <a:latin typeface="Arial" panose="020B0604020202020204" pitchFamily="34" charset="0"/>
-                <a:cs typeface="Arial" panose="020B0604020202020204" pitchFamily="34" charset="0"/>
-              </a:rPr>
-              <a:t>What do these changes mean? Explain significance of parameter change to model design/training. Ex. (one sided soft labels </a:t>
-            </a:r>
-            <a:r>
-              <a:rPr lang="en-US" altLang="ja-JP" sz="4800" dirty="0" err="1">
-                <a:solidFill>
-                  <a:srgbClr val="000000"/>
-                </a:solidFill>
-                <a:latin typeface="Arial" panose="020B0604020202020204" pitchFamily="34" charset="0"/>
-                <a:cs typeface="Arial" panose="020B0604020202020204" pitchFamily="34" charset="0"/>
-              </a:rPr>
-              <a:t>etc</a:t>
-            </a:r>
-            <a:r>
-              <a:rPr lang="en-US" altLang="ja-JP" sz="4800" dirty="0">
-                <a:solidFill>
-                  <a:srgbClr val="000000"/>
-                </a:solidFill>
-                <a:latin typeface="Arial" panose="020B0604020202020204" pitchFamily="34" charset="0"/>
-                <a:cs typeface="Arial" panose="020B0604020202020204" pitchFamily="34" charset="0"/>
-              </a:rPr>
-              <a:t>)</a:t>
-            </a:r>
-          </a:p>
-          <a:p>
-            <a:pPr marL="565150" lvl="1" indent="-565150" defTabSz="2033588" eaLnBrk="1" hangingPunct="1">
-              <a:buNone/>
-              <a:defRPr/>
-            </a:pPr>
             <a:endParaRPr lang="en-US" altLang="en-US" sz="4800" dirty="0">
               <a:solidFill>
                 <a:srgbClr val="000000"/>
@@ -4593,7 +4533,59 @@
                 <a:latin typeface="Arial" panose="020B0604020202020204" pitchFamily="34" charset="0"/>
                 <a:cs typeface="Arial" panose="020B0604020202020204" pitchFamily="34" charset="0"/>
               </a:rPr>
-              <a:t>Best Parameter/design choice:</a:t>
+              <a:t>Best Parameter/design choice that worked here:</a:t>
+            </a:r>
+          </a:p>
+          <a:p>
+            <a:pPr marL="1220778" lvl="4" indent="-565150" defTabSz="2033588">
+              <a:buFont typeface="Wingdings" panose="05000000000000000000" pitchFamily="2" charset="2"/>
+              <a:buChar char="Ø"/>
+              <a:defRPr/>
+            </a:pPr>
+            <a:r>
+              <a:rPr lang="en-US" altLang="en-US" sz="4800" dirty="0">
+                <a:solidFill>
+                  <a:srgbClr val="000000"/>
+                </a:solidFill>
+                <a:latin typeface="Arial" panose="020B0604020202020204" pitchFamily="34" charset="0"/>
+                <a:cs typeface="Arial" panose="020B0604020202020204" pitchFamily="34" charset="0"/>
+              </a:rPr>
+              <a:t>One sided label smoothing </a:t>
+            </a:r>
+            <a:r>
+              <a:rPr lang="en-US" altLang="en-US" sz="4800" dirty="0">
+                <a:solidFill>
+                  <a:srgbClr val="000000"/>
+                </a:solidFill>
+                <a:latin typeface="Arial" panose="020B0604020202020204" pitchFamily="34" charset="0"/>
+                <a:cs typeface="Arial" panose="020B0604020202020204" pitchFamily="34" charset="0"/>
+                <a:sym typeface="Wingdings" pitchFamily="2" charset="2"/>
+              </a:rPr>
+              <a:t> Stops G from only producing one trick to fool D</a:t>
+            </a:r>
+            <a:endParaRPr lang="en-US" altLang="en-US" sz="4800" dirty="0">
+              <a:solidFill>
+                <a:srgbClr val="000000"/>
+              </a:solidFill>
+              <a:latin typeface="Arial" panose="020B0604020202020204" pitchFamily="34" charset="0"/>
+              <a:cs typeface="Arial" panose="020B0604020202020204" pitchFamily="34" charset="0"/>
+            </a:endParaRPr>
+          </a:p>
+          <a:p>
+            <a:pPr marL="1220778" lvl="4" indent="-565150" defTabSz="2033588">
+              <a:buFont typeface="Wingdings" panose="05000000000000000000" pitchFamily="2" charset="2"/>
+              <a:buChar char="Ø"/>
+              <a:defRPr/>
+            </a:pPr>
+            <a:r>
+              <a:rPr lang="en-US" altLang="en-US" sz="4800" dirty="0">
+                <a:solidFill>
+                  <a:srgbClr val="000000"/>
+                </a:solidFill>
+                <a:latin typeface="Arial" panose="020B0604020202020204" pitchFamily="34" charset="0"/>
+                <a:cs typeface="Arial" panose="020B0604020202020204" pitchFamily="34" charset="0"/>
+              </a:rPr>
+              <a:t>Discriminator Learning rate was 4 times lower than the generator</a:t>
             </a:r>
           </a:p>
           <a:p>
@@ -4611,6 +4603,23 @@
                 <a:cs typeface="Arial" panose="020B0604020202020204" pitchFamily="34" charset="0"/>
               </a:rPr>
               <a:t>This change made the discriminator less sensitive to change and it took longer for the model to get good at fake detection</a:t>
+            </a:r>
+          </a:p>
+          <a:p>
+            <a:pPr marL="1220778" lvl="4" indent="-565150" defTabSz="2033588">
+              <a:buFont typeface="Wingdings" panose="05000000000000000000" pitchFamily="2" charset="2"/>
+              <a:buChar char="Ø"/>
+              <a:defRPr/>
+            </a:pPr>
+            <a:r>
+              <a:rPr lang="en-US" altLang="en-US" sz="4800" dirty="0">
+                <a:solidFill>
+                  <a:srgbClr val="000000"/>
+                </a:solidFill>
+                <a:latin typeface="Arial" panose="020B0604020202020204" pitchFamily="34" charset="0"/>
+                <a:cs typeface="Arial" panose="020B0604020202020204" pitchFamily="34" charset="0"/>
+              </a:rPr>
+              <a:t>Tried many things that didn’t help, tricky models, best results still cherry picked</a:t>
             </a:r>
           </a:p>
           <a:p>
@@ -4724,94 +4733,12 @@
         </p:blipFill>
         <p:spPr>
           <a:xfrm>
-            <a:off x="996775" y="3839452"/>
-            <a:ext cx="12282698" cy="9479277"/>
+            <a:off x="214477" y="5597263"/>
+            <a:ext cx="11626013" cy="7384940"/>
           </a:xfrm>
           <a:prstGeom prst="rect">
             <a:avLst/>
           </a:prstGeom>
-        </p:spPr>
-      </p:pic>
-      <p:pic>
-        <p:nvPicPr>
-          <p:cNvPr id="11" name="Picture 10">
-            <a:extLst>
-              <a:ext uri="{FF2B5EF4-FFF2-40B4-BE49-F238E27FC236}">
-                <a16:creationId xmlns:a16="http://schemas.microsoft.com/office/drawing/2014/main" id="{AE521483-B75D-C049-A0EE-4C0FF1EF34C2}"/>
-              </a:ext>
-            </a:extLst>
-          </p:cNvPr>
-          <p:cNvPicPr/>
-          <p:nvPr/>
-        </p:nvPicPr>
-        <p:blipFill rotWithShape="1">
-          <a:blip r:embed="rId6">
-            <a:extLst>
-              <a:ext uri="{28A0092B-C50C-407E-A947-70E740481C1C}">
-                <a14:useLocalDpi xmlns:a14="http://schemas.microsoft.com/office/drawing/2010/main" val="0"/>
-              </a:ext>
-            </a:extLst>
-          </a:blip>
-          <a:srcRect t="25154" b="49392"/>
-          <a:stretch/>
-        </p:blipFill>
-        <p:spPr bwMode="auto">
-          <a:xfrm>
-            <a:off x="15925800" y="4953081"/>
-            <a:ext cx="11195225" cy="3225641"/>
-          </a:xfrm>
-          <a:prstGeom prst="rect">
-            <a:avLst/>
-          </a:prstGeom>
-          <a:ln>
-            <a:noFill/>
-          </a:ln>
-          <a:extLst>
-            <a:ext uri="{53640926-AAD7-44D8-BBD7-CCE9431645EC}">
-              <a14:shadowObscured xmlns:a14="http://schemas.microsoft.com/office/drawing/2010/main"/>
-            </a:ext>
-          </a:extLst>
-        </p:spPr>
-      </p:pic>
-      <p:pic>
-        <p:nvPicPr>
-          <p:cNvPr id="12" name="Picture 11">
-            <a:extLst>
-              <a:ext uri="{FF2B5EF4-FFF2-40B4-BE49-F238E27FC236}">
-                <a16:creationId xmlns:a16="http://schemas.microsoft.com/office/drawing/2014/main" id="{13D44BEA-97E4-E042-B4CF-2B828896DC24}"/>
-              </a:ext>
-            </a:extLst>
-          </p:cNvPr>
-          <p:cNvPicPr/>
-          <p:nvPr/>
-        </p:nvPicPr>
-        <p:blipFill rotWithShape="1">
-          <a:blip r:embed="rId6">
-            <a:extLst>
-              <a:ext uri="{28A0092B-C50C-407E-A947-70E740481C1C}">
-                <a14:useLocalDpi xmlns:a14="http://schemas.microsoft.com/office/drawing/2010/main" val="0"/>
-              </a:ext>
-            </a:extLst>
-          </a:blip>
-          <a:srcRect t="25154" b="49392"/>
-          <a:stretch/>
-        </p:blipFill>
-        <p:spPr bwMode="auto">
-          <a:xfrm>
-            <a:off x="27121025" y="8813959"/>
-            <a:ext cx="11195225" cy="3225641"/>
-          </a:xfrm>
-          <a:prstGeom prst="rect">
-            <a:avLst/>
-          </a:prstGeom>
-          <a:ln>
-            <a:noFill/>
-          </a:ln>
-          <a:extLst>
-            <a:ext uri="{53640926-AAD7-44D8-BBD7-CCE9431645EC}">
-              <a14:shadowObscured xmlns:a14="http://schemas.microsoft.com/office/drawing/2010/main"/>
-            </a:ext>
-          </a:extLst>
         </p:spPr>
       </p:pic>
       <p:cxnSp>
@@ -4902,45 +4829,6 @@
       </p:cxnSp>
       <p:sp>
         <p:nvSpPr>
-          <p:cNvPr id="9" name="TextBox 8">
-            <a:extLst>
-              <a:ext uri="{FF2B5EF4-FFF2-40B4-BE49-F238E27FC236}">
-                <a16:creationId xmlns:a16="http://schemas.microsoft.com/office/drawing/2014/main" id="{E1501B84-1D88-7E45-A65A-D97403285BCC}"/>
-              </a:ext>
-            </a:extLst>
-          </p:cNvPr>
-          <p:cNvSpPr txBox="1"/>
-          <p:nvPr/>
-        </p:nvSpPr>
-        <p:spPr>
-          <a:xfrm>
-            <a:off x="28041600" y="4953081"/>
-            <a:ext cx="10274650" cy="1896545"/>
-          </a:xfrm>
-          <a:prstGeom prst="rect">
-            <a:avLst/>
-          </a:prstGeom>
-          <a:noFill/>
-        </p:spPr>
-        <p:txBody>
-          <a:bodyPr wrap="square" rtlCol="0">
-            <a:spAutoFit/>
-          </a:bodyPr>
-          <a:lstStyle/>
-          <a:p>
-            <a:pPr marL="857250" indent="-857250">
-              <a:buFont typeface="Wingdings" pitchFamily="2" charset="2"/>
-              <a:buChar char="Ø"/>
-            </a:pPr>
-            <a:r>
-              <a:rPr lang="en-US" dirty="0"/>
-              <a:t>This is where I discuss the baseline model parameters</a:t>
-            </a:r>
-          </a:p>
-        </p:txBody>
-      </p:sp>
-      <p:sp>
-        <p:nvSpPr>
           <p:cNvPr id="20" name="TextBox 19">
             <a:extLst>
               <a:ext uri="{FF2B5EF4-FFF2-40B4-BE49-F238E27FC236}">
@@ -4953,8 +4841,8 @@
         </p:nvSpPr>
         <p:spPr>
           <a:xfrm>
-            <a:off x="16383000" y="9228655"/>
-            <a:ext cx="10274650" cy="2798651"/>
+            <a:off x="30140778" y="17922192"/>
+            <a:ext cx="9652168" cy="3477875"/>
           </a:xfrm>
           <a:prstGeom prst="rect">
             <a:avLst/>
@@ -4972,9 +4860,60 @@
               <a:buChar char="Ø"/>
             </a:pPr>
             <a:r>
-              <a:rPr lang="en-US" dirty="0"/>
-              <a:t>This is where I discuss the best highly variational set results parameters</a:t>
-            </a:r>
+              <a:rPr lang="en-US" sz="4400" dirty="0">
+                <a:solidFill>
+                  <a:srgbClr val="FF0000"/>
+                </a:solidFill>
+              </a:rPr>
+              <a:t>Best Results came from:</a:t>
+            </a:r>
+          </a:p>
+          <a:p>
+            <a:pPr marL="2370804" lvl="1" indent="-857250">
+              <a:buFont typeface="Wingdings" pitchFamily="2" charset="2"/>
+              <a:buChar char="Ø"/>
+            </a:pPr>
+            <a:r>
+              <a:rPr lang="en-US" sz="4400" dirty="0">
+                <a:solidFill>
+                  <a:srgbClr val="FF0000"/>
+                </a:solidFill>
+              </a:rPr>
+              <a:t>More training epochs</a:t>
+            </a:r>
+          </a:p>
+          <a:p>
+            <a:pPr marL="2370804" lvl="1" indent="-857250">
+              <a:buFont typeface="Wingdings" pitchFamily="2" charset="2"/>
+              <a:buChar char="Ø"/>
+            </a:pPr>
+            <a:r>
+              <a:rPr lang="en-US" sz="4400" dirty="0">
+                <a:solidFill>
+                  <a:srgbClr val="FF0000"/>
+                </a:solidFill>
+              </a:rPr>
+              <a:t>More filters in each layer</a:t>
+            </a:r>
+          </a:p>
+          <a:p>
+            <a:pPr marL="2370804" lvl="1" indent="-857250">
+              <a:buFont typeface="Wingdings" pitchFamily="2" charset="2"/>
+              <a:buChar char="Ø"/>
+            </a:pPr>
+            <a:r>
+              <a:rPr lang="en-US" sz="4400" dirty="0">
+                <a:solidFill>
+                  <a:srgbClr val="FF0000"/>
+                </a:solidFill>
+              </a:rPr>
+              <a:t>Lowering D learning Rate compared to G</a:t>
+            </a:r>
+            <a:endParaRPr lang="en-US" dirty="0">
+              <a:solidFill>
+                <a:srgbClr val="FF0000"/>
+              </a:solidFill>
+            </a:endParaRPr>
           </a:p>
         </p:txBody>
       </p:sp>
@@ -4994,8 +4933,8 @@
         </p:nvSpPr>
         <p:spPr bwMode="auto">
           <a:xfrm>
-            <a:off x="1381130" y="13318729"/>
-            <a:ext cx="14179547" cy="7962586"/>
+            <a:off x="214478" y="14867539"/>
+            <a:ext cx="15346200" cy="6413775"/>
           </a:xfrm>
           <a:prstGeom prst="rect">
             <a:avLst/>
@@ -5220,7 +5159,7 @@
                 <a:latin typeface="Arial" panose="020B0604020202020204" pitchFamily="34" charset="0"/>
                 <a:cs typeface="Arial" panose="020B0604020202020204" pitchFamily="34" charset="0"/>
               </a:rPr>
-              <a:t>Unique qualities</a:t>
+              <a:t>Generate images and “evaluate realness”</a:t>
             </a:r>
           </a:p>
           <a:p>
@@ -5237,24 +5176,7 @@
                 <a:latin typeface="Arial" panose="020B0604020202020204" pitchFamily="34" charset="0"/>
                 <a:cs typeface="Arial" panose="020B0604020202020204" pitchFamily="34" charset="0"/>
               </a:rPr>
-              <a:t>What are they used for</a:t>
-            </a:r>
-          </a:p>
-          <a:p>
-            <a:pPr marL="565150" lvl="1" indent="-565150" defTabSz="2033588" eaLnBrk="1" hangingPunct="1">
-              <a:buFont typeface="Wingdings" panose="05000000000000000000" pitchFamily="2" charset="2"/>
-              <a:buChar char="Ø"/>
-              <a:defRPr/>
-            </a:pPr>
-            <a:r>
-              <a:rPr lang="en-US" altLang="en-US" sz="4800" dirty="0">
-                <a:solidFill>
-                  <a:srgbClr val="000000"/>
-                </a:solidFill>
-                <a:latin typeface="Arial" panose="020B0604020202020204" pitchFamily="34" charset="0"/>
-                <a:cs typeface="Arial" panose="020B0604020202020204" pitchFamily="34" charset="0"/>
-              </a:rPr>
-              <a:t>Training Process:</a:t>
+              <a:t>2 Networks competing and updating</a:t>
             </a:r>
           </a:p>
           <a:p>
@@ -5273,27 +5195,6 @@
               </a:rPr>
               <a:t>Goal equations for D and G:</a:t>
             </a:r>
-          </a:p>
-          <a:p>
-            <a:pPr marL="701468" lvl="2" indent="-565150" defTabSz="2033588" eaLnBrk="1" hangingPunct="1">
-              <a:buFont typeface="Wingdings" panose="05000000000000000000" pitchFamily="2" charset="2"/>
-              <a:buChar char="Ø"/>
-              <a:defRPr/>
-            </a:pPr>
-            <a:endParaRPr lang="en-US" altLang="en-US" sz="4400" dirty="0">
-              <a:solidFill>
-                <a:srgbClr val="000000"/>
-              </a:solidFill>
-              <a:latin typeface="Arial" panose="020B0604020202020204" pitchFamily="34" charset="0"/>
-              <a:cs typeface="Arial" panose="020B0604020202020204" pitchFamily="34" charset="0"/>
-            </a:endParaRPr>
-          </a:p>
-          <a:p>
-            <a:pPr marL="565150" lvl="1" indent="-565150" defTabSz="2033588" eaLnBrk="1" hangingPunct="1">
-              <a:buFont typeface="Wingdings" panose="05000000000000000000" pitchFamily="2" charset="2"/>
-              <a:buChar char="Ø"/>
-              <a:defRPr/>
-            </a:pPr>
             <a:endParaRPr lang="en-US" altLang="en-US" sz="4800" dirty="0">
               <a:solidFill>
                 <a:srgbClr val="000000"/>
@@ -5328,13 +5229,13 @@
           <p:nvPr/>
         </p:nvPicPr>
         <p:blipFill rotWithShape="1">
-          <a:blip r:embed="rId7"/>
+          <a:blip r:embed="rId6"/>
           <a:srcRect l="12554" t="24425" r="6703" b="34450"/>
           <a:stretch/>
         </p:blipFill>
         <p:spPr>
           <a:xfrm>
-            <a:off x="1365890" y="18059024"/>
+            <a:off x="1009884" y="18402544"/>
             <a:ext cx="10896601" cy="1203326"/>
           </a:xfrm>
           <a:prstGeom prst="rect">
@@ -5357,13 +5258,13 @@
           <p:nvPr/>
         </p:nvPicPr>
         <p:blipFill rotWithShape="1">
-          <a:blip r:embed="rId8"/>
+          <a:blip r:embed="rId7"/>
           <a:srcRect t="22773" b="21402"/>
           <a:stretch/>
         </p:blipFill>
         <p:spPr>
           <a:xfrm>
-            <a:off x="4219304" y="19637758"/>
+            <a:off x="4587099" y="19555387"/>
             <a:ext cx="12410395" cy="1760717"/>
           </a:xfrm>
           <a:prstGeom prst="rect">
@@ -5371,6 +5272,1058 @@
           </a:prstGeom>
         </p:spPr>
       </p:pic>
+      <p:sp>
+        <p:nvSpPr>
+          <p:cNvPr id="4" name="Rectangle 12">
+            <a:extLst>
+              <a:ext uri="{FF2B5EF4-FFF2-40B4-BE49-F238E27FC236}">
+                <a16:creationId xmlns:a16="http://schemas.microsoft.com/office/drawing/2014/main" id="{EB09F824-1798-8A41-BB47-1F01428F341C}"/>
+              </a:ext>
+            </a:extLst>
+          </p:cNvPr>
+          <p:cNvSpPr>
+            <a:spLocks noChangeArrowheads="1"/>
+          </p:cNvSpPr>
+          <p:nvPr/>
+        </p:nvSpPr>
+        <p:spPr bwMode="auto">
+          <a:xfrm flipH="1">
+            <a:off x="65164049" y="7698907"/>
+            <a:ext cx="280194327" cy="2149815"/>
+          </a:xfrm>
+          <a:prstGeom prst="rect">
+            <a:avLst/>
+          </a:prstGeom>
+          <a:noFill/>
+          <a:ln>
+            <a:noFill/>
+          </a:ln>
+          <a:effectLst/>
+          <a:extLst>
+            <a:ext uri="{909E8E84-426E-40DD-AFC4-6F175D3DCCD1}">
+              <a14:hiddenFill xmlns:a14="http://schemas.microsoft.com/office/drawing/2010/main">
+                <a:solidFill>
+                  <a:schemeClr val="accent1"/>
+                </a:solidFill>
+              </a14:hiddenFill>
+            </a:ext>
+            <a:ext uri="{91240B29-F687-4F45-9708-019B960494DF}">
+              <a14:hiddenLine xmlns:a14="http://schemas.microsoft.com/office/drawing/2010/main" w="9525">
+                <a:solidFill>
+                  <a:schemeClr val="tx1"/>
+                </a:solidFill>
+                <a:miter lim="800000"/>
+                <a:headEnd/>
+                <a:tailEnd/>
+              </a14:hiddenLine>
+            </a:ext>
+            <a:ext uri="{AF507438-7753-43E0-B8FC-AC1667EBCBE1}">
+              <a14:hiddenEffects xmlns:a14="http://schemas.microsoft.com/office/drawing/2010/main">
+                <a:effectLst>
+                  <a:outerShdw dist="35921" dir="2700000" algn="ctr" rotWithShape="0">
+                    <a:schemeClr val="bg2"/>
+                  </a:outerShdw>
+                </a:effectLst>
+              </a14:hiddenEffects>
+            </a:ext>
+          </a:extLst>
+        </p:spPr>
+        <p:txBody>
+          <a:bodyPr vert="horz" wrap="square" lIns="91440" tIns="45720" rIns="91440" bIns="45720" numCol="1" anchor="ctr" anchorCtr="0" compatLnSpc="1">
+            <a:prstTxWarp prst="textNoShape">
+              <a:avLst/>
+            </a:prstTxWarp>
+            <a:spAutoFit/>
+          </a:bodyPr>
+          <a:lstStyle/>
+          <a:p>
+            <a:endParaRPr lang="en-US"/>
+          </a:p>
+        </p:txBody>
+      </p:sp>
+      <p:pic>
+        <p:nvPicPr>
+          <p:cNvPr id="31" name="Picture 30">
+            <a:extLst>
+              <a:ext uri="{FF2B5EF4-FFF2-40B4-BE49-F238E27FC236}">
+                <a16:creationId xmlns:a16="http://schemas.microsoft.com/office/drawing/2014/main" id="{321AEDDB-8F88-5F4A-840A-4E212091C85B}"/>
+              </a:ext>
+            </a:extLst>
+          </p:cNvPr>
+          <p:cNvPicPr/>
+          <p:nvPr/>
+        </p:nvPicPr>
+        <p:blipFill>
+          <a:blip r:embed="rId8"/>
+          <a:stretch>
+            <a:fillRect/>
+          </a:stretch>
+        </p:blipFill>
+        <p:spPr bwMode="auto">
+          <a:xfrm>
+            <a:off x="27035356" y="8634844"/>
+            <a:ext cx="10862026" cy="3178888"/>
+          </a:xfrm>
+          <a:prstGeom prst="rect">
+            <a:avLst/>
+          </a:prstGeom>
+          <a:ln>
+            <a:noFill/>
+          </a:ln>
+          <a:extLst>
+            <a:ext uri="{53640926-AAD7-44D8-BBD7-CCE9431645EC}">
+              <a14:shadowObscured xmlns:a14="http://schemas.microsoft.com/office/drawing/2010/main"/>
+            </a:ext>
+          </a:extLst>
+        </p:spPr>
+      </p:pic>
+      <p:pic>
+        <p:nvPicPr>
+          <p:cNvPr id="32" name="Picture 31">
+            <a:extLst>
+              <a:ext uri="{FF2B5EF4-FFF2-40B4-BE49-F238E27FC236}">
+                <a16:creationId xmlns:a16="http://schemas.microsoft.com/office/drawing/2014/main" id="{5065E67D-7CB1-844A-9AF7-58FAC679DBF7}"/>
+              </a:ext>
+            </a:extLst>
+          </p:cNvPr>
+          <p:cNvPicPr/>
+          <p:nvPr/>
+        </p:nvPicPr>
+        <p:blipFill rotWithShape="1">
+          <a:blip r:embed="rId9">
+            <a:extLst>
+              <a:ext uri="{28A0092B-C50C-407E-A947-70E740481C1C}">
+                <a14:useLocalDpi xmlns:a14="http://schemas.microsoft.com/office/drawing/2010/main" val="0"/>
+              </a:ext>
+            </a:extLst>
+          </a:blip>
+          <a:srcRect t="48482"/>
+          <a:stretch/>
+        </p:blipFill>
+        <p:spPr bwMode="auto">
+          <a:xfrm>
+            <a:off x="11814991" y="6960778"/>
+            <a:ext cx="14838625" cy="2002092"/>
+          </a:xfrm>
+          <a:prstGeom prst="rect">
+            <a:avLst/>
+          </a:prstGeom>
+          <a:ln>
+            <a:noFill/>
+          </a:ln>
+          <a:extLst>
+            <a:ext uri="{53640926-AAD7-44D8-BBD7-CCE9431645EC}">
+              <a14:shadowObscured xmlns:a14="http://schemas.microsoft.com/office/drawing/2010/main"/>
+            </a:ext>
+          </a:extLst>
+        </p:spPr>
+      </p:pic>
+      <p:pic>
+        <p:nvPicPr>
+          <p:cNvPr id="33" name="Picture 32">
+            <a:extLst>
+              <a:ext uri="{FF2B5EF4-FFF2-40B4-BE49-F238E27FC236}">
+                <a16:creationId xmlns:a16="http://schemas.microsoft.com/office/drawing/2014/main" id="{A78438B6-ABA6-B547-831E-C4C2FBF9A457}"/>
+              </a:ext>
+            </a:extLst>
+          </p:cNvPr>
+          <p:cNvPicPr/>
+          <p:nvPr/>
+        </p:nvPicPr>
+        <p:blipFill>
+          <a:blip r:embed="rId10">
+            <a:extLst>
+              <a:ext uri="{28A0092B-C50C-407E-A947-70E740481C1C}">
+                <a14:useLocalDpi xmlns:a14="http://schemas.microsoft.com/office/drawing/2010/main" val="0"/>
+              </a:ext>
+            </a:extLst>
+          </a:blip>
+          <a:stretch>
+            <a:fillRect/>
+          </a:stretch>
+        </p:blipFill>
+        <p:spPr bwMode="auto">
+          <a:xfrm>
+            <a:off x="26897077" y="4735336"/>
+            <a:ext cx="10823448" cy="2776324"/>
+          </a:xfrm>
+          <a:prstGeom prst="rect">
+            <a:avLst/>
+          </a:prstGeom>
+          <a:ln>
+            <a:noFill/>
+          </a:ln>
+          <a:extLst>
+            <a:ext uri="{53640926-AAD7-44D8-BBD7-CCE9431645EC}">
+              <a14:shadowObscured xmlns:a14="http://schemas.microsoft.com/office/drawing/2010/main"/>
+            </a:ext>
+          </a:extLst>
+        </p:spPr>
+      </p:pic>
+      <p:pic>
+        <p:nvPicPr>
+          <p:cNvPr id="1041" name="Picture 22">
+            <a:extLst>
+              <a:ext uri="{FF2B5EF4-FFF2-40B4-BE49-F238E27FC236}">
+                <a16:creationId xmlns:a16="http://schemas.microsoft.com/office/drawing/2014/main" id="{DA51F4EF-CF46-1E48-A22B-170097F37D39}"/>
+              </a:ext>
+            </a:extLst>
+          </p:cNvPr>
+          <p:cNvPicPr>
+            <a:picLocks noChangeAspect="1" noChangeArrowheads="1"/>
+          </p:cNvPicPr>
+          <p:nvPr/>
+        </p:nvPicPr>
+        <p:blipFill>
+          <a:blip r:embed="rId11">
+            <a:extLst>
+              <a:ext uri="{28A0092B-C50C-407E-A947-70E740481C1C}">
+                <a14:useLocalDpi xmlns:a14="http://schemas.microsoft.com/office/drawing/2010/main" val="0"/>
+              </a:ext>
+            </a:extLst>
+          </a:blip>
+          <a:srcRect/>
+          <a:stretch>
+            <a:fillRect/>
+          </a:stretch>
+        </p:blipFill>
+        <p:spPr bwMode="auto">
+          <a:xfrm>
+            <a:off x="25225299" y="19072523"/>
+            <a:ext cx="2437534" cy="2559411"/>
+          </a:xfrm>
+          <a:prstGeom prst="rect">
+            <a:avLst/>
+          </a:prstGeom>
+          <a:noFill/>
+          <a:extLst>
+            <a:ext uri="{909E8E84-426E-40DD-AFC4-6F175D3DCCD1}">
+              <a14:hiddenFill xmlns:a14="http://schemas.microsoft.com/office/drawing/2010/main">
+                <a:solidFill>
+                  <a:srgbClr val="FFFFFF"/>
+                </a:solidFill>
+              </a14:hiddenFill>
+            </a:ext>
+          </a:extLst>
+        </p:spPr>
+      </p:pic>
+      <p:pic>
+        <p:nvPicPr>
+          <p:cNvPr id="1040" name="Picture 23">
+            <a:extLst>
+              <a:ext uri="{FF2B5EF4-FFF2-40B4-BE49-F238E27FC236}">
+                <a16:creationId xmlns:a16="http://schemas.microsoft.com/office/drawing/2014/main" id="{7D587B2E-4AC9-AF4F-A87E-CEE7502B7218}"/>
+              </a:ext>
+            </a:extLst>
+          </p:cNvPr>
+          <p:cNvPicPr>
+            <a:picLocks noChangeAspect="1" noChangeArrowheads="1"/>
+          </p:cNvPicPr>
+          <p:nvPr/>
+        </p:nvPicPr>
+        <p:blipFill>
+          <a:blip r:embed="rId12">
+            <a:extLst>
+              <a:ext uri="{28A0092B-C50C-407E-A947-70E740481C1C}">
+                <a14:useLocalDpi xmlns:a14="http://schemas.microsoft.com/office/drawing/2010/main" val="0"/>
+              </a:ext>
+            </a:extLst>
+          </a:blip>
+          <a:srcRect/>
+          <a:stretch>
+            <a:fillRect/>
+          </a:stretch>
+        </p:blipFill>
+        <p:spPr bwMode="auto">
+          <a:xfrm>
+            <a:off x="27766994" y="19065555"/>
+            <a:ext cx="2559410" cy="2559410"/>
+          </a:xfrm>
+          <a:prstGeom prst="rect">
+            <a:avLst/>
+          </a:prstGeom>
+          <a:noFill/>
+          <a:extLst>
+            <a:ext uri="{909E8E84-426E-40DD-AFC4-6F175D3DCCD1}">
+              <a14:hiddenFill xmlns:a14="http://schemas.microsoft.com/office/drawing/2010/main">
+                <a:solidFill>
+                  <a:srgbClr val="FFFFFF"/>
+                </a:solidFill>
+              </a14:hiddenFill>
+            </a:ext>
+          </a:extLst>
+        </p:spPr>
+      </p:pic>
+      <p:pic>
+        <p:nvPicPr>
+          <p:cNvPr id="1039" name="Picture 24">
+            <a:extLst>
+              <a:ext uri="{FF2B5EF4-FFF2-40B4-BE49-F238E27FC236}">
+                <a16:creationId xmlns:a16="http://schemas.microsoft.com/office/drawing/2014/main" id="{83770EA8-C13F-1D4D-B8E7-86087B33E8C1}"/>
+              </a:ext>
+            </a:extLst>
+          </p:cNvPr>
+          <p:cNvPicPr>
+            <a:picLocks noChangeAspect="1" noChangeArrowheads="1"/>
+          </p:cNvPicPr>
+          <p:nvPr/>
+        </p:nvPicPr>
+        <p:blipFill>
+          <a:blip r:embed="rId13">
+            <a:extLst>
+              <a:ext uri="{28A0092B-C50C-407E-A947-70E740481C1C}">
+                <a14:useLocalDpi xmlns:a14="http://schemas.microsoft.com/office/drawing/2010/main" val="0"/>
+              </a:ext>
+            </a:extLst>
+          </a:blip>
+          <a:srcRect/>
+          <a:stretch>
+            <a:fillRect/>
+          </a:stretch>
+        </p:blipFill>
+        <p:spPr bwMode="auto">
+          <a:xfrm>
+            <a:off x="22595513" y="19065555"/>
+            <a:ext cx="2559410" cy="2559410"/>
+          </a:xfrm>
+          <a:prstGeom prst="rect">
+            <a:avLst/>
+          </a:prstGeom>
+          <a:noFill/>
+          <a:extLst>
+            <a:ext uri="{909E8E84-426E-40DD-AFC4-6F175D3DCCD1}">
+              <a14:hiddenFill xmlns:a14="http://schemas.microsoft.com/office/drawing/2010/main">
+                <a:solidFill>
+                  <a:srgbClr val="FFFFFF"/>
+                </a:solidFill>
+              </a14:hiddenFill>
+            </a:ext>
+          </a:extLst>
+        </p:spPr>
+      </p:pic>
+      <p:pic>
+        <p:nvPicPr>
+          <p:cNvPr id="1038" name="Picture 25">
+            <a:extLst>
+              <a:ext uri="{FF2B5EF4-FFF2-40B4-BE49-F238E27FC236}">
+                <a16:creationId xmlns:a16="http://schemas.microsoft.com/office/drawing/2014/main" id="{A46302E5-3BAE-1B4A-A003-1184638E0947}"/>
+              </a:ext>
+            </a:extLst>
+          </p:cNvPr>
+          <p:cNvPicPr>
+            <a:picLocks noChangeAspect="1" noChangeArrowheads="1"/>
+          </p:cNvPicPr>
+          <p:nvPr/>
+        </p:nvPicPr>
+        <p:blipFill>
+          <a:blip r:embed="rId14">
+            <a:extLst>
+              <a:ext uri="{28A0092B-C50C-407E-A947-70E740481C1C}">
+                <a14:useLocalDpi xmlns:a14="http://schemas.microsoft.com/office/drawing/2010/main" val="0"/>
+              </a:ext>
+            </a:extLst>
+          </a:blip>
+          <a:srcRect/>
+          <a:stretch>
+            <a:fillRect/>
+          </a:stretch>
+        </p:blipFill>
+        <p:spPr bwMode="auto">
+          <a:xfrm>
+            <a:off x="20001537" y="19079494"/>
+            <a:ext cx="2559410" cy="2559410"/>
+          </a:xfrm>
+          <a:prstGeom prst="rect">
+            <a:avLst/>
+          </a:prstGeom>
+          <a:noFill/>
+          <a:extLst>
+            <a:ext uri="{909E8E84-426E-40DD-AFC4-6F175D3DCCD1}">
+              <a14:hiddenFill xmlns:a14="http://schemas.microsoft.com/office/drawing/2010/main">
+                <a:solidFill>
+                  <a:srgbClr val="FFFFFF"/>
+                </a:solidFill>
+              </a14:hiddenFill>
+            </a:ext>
+          </a:extLst>
+        </p:spPr>
+      </p:pic>
+      <p:pic>
+        <p:nvPicPr>
+          <p:cNvPr id="1037" name="Picture 26">
+            <a:extLst>
+              <a:ext uri="{FF2B5EF4-FFF2-40B4-BE49-F238E27FC236}">
+                <a16:creationId xmlns:a16="http://schemas.microsoft.com/office/drawing/2014/main" id="{9D0782C5-3A38-AF48-B1EC-A1EAC5836C05}"/>
+              </a:ext>
+            </a:extLst>
+          </p:cNvPr>
+          <p:cNvPicPr>
+            <a:picLocks noChangeAspect="1" noChangeArrowheads="1"/>
+          </p:cNvPicPr>
+          <p:nvPr/>
+        </p:nvPicPr>
+        <p:blipFill>
+          <a:blip r:embed="rId15">
+            <a:extLst>
+              <a:ext uri="{28A0092B-C50C-407E-A947-70E740481C1C}">
+                <a14:useLocalDpi xmlns:a14="http://schemas.microsoft.com/office/drawing/2010/main" val="0"/>
+              </a:ext>
+            </a:extLst>
+          </a:blip>
+          <a:srcRect/>
+          <a:stretch>
+            <a:fillRect/>
+          </a:stretch>
+        </p:blipFill>
+        <p:spPr bwMode="auto">
+          <a:xfrm>
+            <a:off x="17335341" y="19058165"/>
+            <a:ext cx="2681287" cy="2559410"/>
+          </a:xfrm>
+          <a:prstGeom prst="rect">
+            <a:avLst/>
+          </a:prstGeom>
+          <a:noFill/>
+          <a:extLst>
+            <a:ext uri="{909E8E84-426E-40DD-AFC4-6F175D3DCCD1}">
+              <a14:hiddenFill xmlns:a14="http://schemas.microsoft.com/office/drawing/2010/main">
+                <a:solidFill>
+                  <a:srgbClr val="FFFFFF"/>
+                </a:solidFill>
+              </a14:hiddenFill>
+            </a:ext>
+          </a:extLst>
+        </p:spPr>
+      </p:pic>
+      <p:sp>
+        <p:nvSpPr>
+          <p:cNvPr id="7" name="Rectangle 18">
+            <a:extLst>
+              <a:ext uri="{FF2B5EF4-FFF2-40B4-BE49-F238E27FC236}">
+                <a16:creationId xmlns:a16="http://schemas.microsoft.com/office/drawing/2014/main" id="{B1CF8202-12BA-854C-AE26-D09A785845CD}"/>
+              </a:ext>
+            </a:extLst>
+          </p:cNvPr>
+          <p:cNvSpPr>
+            <a:spLocks noChangeArrowheads="1"/>
+          </p:cNvSpPr>
+          <p:nvPr/>
+        </p:nvSpPr>
+        <p:spPr bwMode="auto">
+          <a:xfrm>
+            <a:off x="32308801" y="8214943"/>
+            <a:ext cx="230737152" cy="1842425"/>
+          </a:xfrm>
+          <a:prstGeom prst="rect">
+            <a:avLst/>
+          </a:prstGeom>
+          <a:noFill/>
+          <a:ln>
+            <a:noFill/>
+          </a:ln>
+          <a:effectLst/>
+          <a:extLst>
+            <a:ext uri="{909E8E84-426E-40DD-AFC4-6F175D3DCCD1}">
+              <a14:hiddenFill xmlns:a14="http://schemas.microsoft.com/office/drawing/2010/main">
+                <a:solidFill>
+                  <a:schemeClr val="accent1"/>
+                </a:solidFill>
+              </a14:hiddenFill>
+            </a:ext>
+            <a:ext uri="{91240B29-F687-4F45-9708-019B960494DF}">
+              <a14:hiddenLine xmlns:a14="http://schemas.microsoft.com/office/drawing/2010/main" w="9525">
+                <a:solidFill>
+                  <a:schemeClr val="tx1"/>
+                </a:solidFill>
+                <a:miter lim="800000"/>
+                <a:headEnd/>
+                <a:tailEnd/>
+              </a14:hiddenLine>
+            </a:ext>
+            <a:ext uri="{AF507438-7753-43E0-B8FC-AC1667EBCBE1}">
+              <a14:hiddenEffects xmlns:a14="http://schemas.microsoft.com/office/drawing/2010/main">
+                <a:effectLst>
+                  <a:outerShdw dist="35921" dir="2700000" algn="ctr" rotWithShape="0">
+                    <a:schemeClr val="bg2"/>
+                  </a:outerShdw>
+                </a:effectLst>
+              </a14:hiddenEffects>
+            </a:ext>
+          </a:extLst>
+        </p:spPr>
+        <p:txBody>
+          <a:bodyPr vert="horz" wrap="square" lIns="91440" tIns="45720" rIns="91440" bIns="45720" numCol="1" anchor="ctr" anchorCtr="0" compatLnSpc="1">
+            <a:prstTxWarp prst="textNoShape">
+              <a:avLst/>
+            </a:prstTxWarp>
+            <a:spAutoFit/>
+          </a:bodyPr>
+          <a:lstStyle/>
+          <a:p>
+            <a:endParaRPr lang="en-US"/>
+          </a:p>
+        </p:txBody>
+      </p:sp>
+      <p:sp>
+        <p:nvSpPr>
+          <p:cNvPr id="41" name="Content Placeholder 15">
+            <a:extLst>
+              <a:ext uri="{FF2B5EF4-FFF2-40B4-BE49-F238E27FC236}">
+                <a16:creationId xmlns:a16="http://schemas.microsoft.com/office/drawing/2014/main" id="{E7BC2685-C012-E543-B59D-13D309E4CEA0}"/>
+              </a:ext>
+            </a:extLst>
+          </p:cNvPr>
+          <p:cNvSpPr txBox="1">
+            <a:spLocks/>
+          </p:cNvSpPr>
+          <p:nvPr/>
+        </p:nvSpPr>
+        <p:spPr bwMode="auto">
+          <a:xfrm>
+            <a:off x="1381130" y="2865396"/>
+            <a:ext cx="35185340" cy="1897303"/>
+          </a:xfrm>
+          <a:prstGeom prst="rect">
+            <a:avLst/>
+          </a:prstGeom>
+          <a:noFill/>
+          <a:ln>
+            <a:noFill/>
+          </a:ln>
+          <a:extLst>
+            <a:ext uri="{909E8E84-426E-40DD-AFC4-6F175D3DCCD1}">
+              <a14:hiddenFill xmlns:a14="http://schemas.microsoft.com/office/drawing/2010/main">
+                <a:solidFill>
+                  <a:srgbClr val="FFFFFF"/>
+                </a:solidFill>
+              </a14:hiddenFill>
+            </a:ext>
+            <a:ext uri="{91240B29-F687-4F45-9708-019B960494DF}">
+              <a14:hiddenLine xmlns:a14="http://schemas.microsoft.com/office/drawing/2010/main" w="9525">
+                <a:solidFill>
+                  <a:srgbClr val="000000"/>
+                </a:solidFill>
+                <a:miter lim="800000"/>
+                <a:headEnd/>
+                <a:tailEnd/>
+              </a14:hiddenLine>
+            </a:ext>
+          </a:extLst>
+        </p:spPr>
+        <p:txBody>
+          <a:bodyPr vert="horz" wrap="square" lIns="294846" tIns="147423" rIns="294846" bIns="147423" numCol="1" anchor="t" anchorCtr="0" compatLnSpc="1">
+            <a:prstTxWarp prst="textNoShape">
+              <a:avLst/>
+            </a:prstTxWarp>
+            <a:noAutofit/>
+          </a:bodyPr>
+          <a:lstStyle>
+            <a:lvl1pPr marL="410256" indent="-410256" algn="l" defTabSz="1471613" rtl="0" eaLnBrk="0" fontAlgn="base" hangingPunct="0">
+              <a:spcBef>
+                <a:spcPct val="20000"/>
+              </a:spcBef>
+              <a:spcAft>
+                <a:spcPct val="0"/>
+              </a:spcAft>
+              <a:buFont typeface="Arial" panose="020B0604020202020204" pitchFamily="34" charset="0"/>
+              <a:buNone/>
+              <a:defRPr sz="2900" kern="1200">
+                <a:solidFill>
+                  <a:schemeClr val="tx1"/>
+                </a:solidFill>
+                <a:latin typeface="Arial"/>
+                <a:ea typeface="MS PGothic" panose="020B0600070205080204" pitchFamily="34" charset="-128"/>
+                <a:cs typeface="Arial"/>
+              </a:defRPr>
+            </a:lvl1pPr>
+            <a:lvl2pPr marL="793247" indent="-655629" algn="l" defTabSz="1471613" rtl="0" eaLnBrk="0" fontAlgn="base" hangingPunct="0">
+              <a:spcBef>
+                <a:spcPct val="20000"/>
+              </a:spcBef>
+              <a:spcAft>
+                <a:spcPct val="0"/>
+              </a:spcAft>
+              <a:buFont typeface="Wingdings" charset="2"/>
+              <a:buChar char="Ø"/>
+              <a:defRPr sz="2300" kern="1200">
+                <a:solidFill>
+                  <a:schemeClr val="tx1"/>
+                </a:solidFill>
+                <a:latin typeface="Arial"/>
+                <a:ea typeface="MS PGothic" panose="020B0600070205080204" pitchFamily="34" charset="-128"/>
+                <a:cs typeface="Arial"/>
+              </a:defRPr>
+            </a:lvl2pPr>
+            <a:lvl3pPr marL="929565" indent="-546573" algn="l" defTabSz="1471613" rtl="0" eaLnBrk="0" fontAlgn="base" hangingPunct="0">
+              <a:spcBef>
+                <a:spcPct val="20000"/>
+              </a:spcBef>
+              <a:spcAft>
+                <a:spcPct val="0"/>
+              </a:spcAft>
+              <a:buFont typeface="Arial" panose="020B0604020202020204" pitchFamily="34" charset="0"/>
+              <a:buChar char="•"/>
+              <a:defRPr sz="1900" kern="1200">
+                <a:solidFill>
+                  <a:schemeClr val="tx1"/>
+                </a:solidFill>
+                <a:latin typeface="Arial"/>
+                <a:ea typeface="MS PGothic" panose="020B0600070205080204" pitchFamily="34" charset="-128"/>
+                <a:cs typeface="Arial"/>
+              </a:defRPr>
+            </a:lvl3pPr>
+            <a:lvl4pPr marL="1202201" indent="-655629" algn="l" defTabSz="1471613" rtl="0" eaLnBrk="0" fontAlgn="base" hangingPunct="0">
+              <a:spcBef>
+                <a:spcPct val="20000"/>
+              </a:spcBef>
+              <a:spcAft>
+                <a:spcPct val="0"/>
+              </a:spcAft>
+              <a:buFont typeface="Arial" panose="020B0604020202020204" pitchFamily="34" charset="0"/>
+              <a:buChar char="–"/>
+              <a:defRPr sz="1600" kern="1200">
+                <a:solidFill>
+                  <a:schemeClr val="tx1"/>
+                </a:solidFill>
+                <a:latin typeface="Arial"/>
+                <a:ea typeface="MS PGothic" panose="020B0600070205080204" pitchFamily="34" charset="-128"/>
+                <a:cs typeface="Arial"/>
+              </a:defRPr>
+            </a:lvl4pPr>
+            <a:lvl5pPr marL="1448875" indent="-1448875" algn="l" defTabSz="1471613" rtl="0" eaLnBrk="0" fontAlgn="base" hangingPunct="0">
+              <a:spcBef>
+                <a:spcPct val="20000"/>
+              </a:spcBef>
+              <a:spcAft>
+                <a:spcPct val="0"/>
+              </a:spcAft>
+              <a:buFont typeface="Arial" panose="020B0604020202020204" pitchFamily="34" charset="0"/>
+              <a:buChar char="»"/>
+              <a:defRPr sz="2300" kern="1200">
+                <a:solidFill>
+                  <a:schemeClr val="tx1"/>
+                </a:solidFill>
+                <a:latin typeface="+mn-lt"/>
+                <a:ea typeface="MS PGothic" panose="020B0600070205080204" pitchFamily="34" charset="-128"/>
+                <a:cs typeface="+mn-cs"/>
+              </a:defRPr>
+            </a:lvl5pPr>
+            <a:lvl6pPr marL="8108236" indent="-737112" algn="l" defTabSz="1474225" rtl="0" eaLnBrk="1" latinLnBrk="0" hangingPunct="1">
+              <a:spcBef>
+                <a:spcPct val="20000"/>
+              </a:spcBef>
+              <a:buFont typeface="Arial"/>
+              <a:buChar char="•"/>
+              <a:defRPr sz="5200" kern="1200">
+                <a:solidFill>
+                  <a:schemeClr val="tx1"/>
+                </a:solidFill>
+                <a:latin typeface="+mn-lt"/>
+                <a:ea typeface="+mn-ea"/>
+                <a:cs typeface="+mn-cs"/>
+              </a:defRPr>
+            </a:lvl6pPr>
+            <a:lvl7pPr marL="9582462" indent="-737112" algn="l" defTabSz="1474225" rtl="0" eaLnBrk="1" latinLnBrk="0" hangingPunct="1">
+              <a:spcBef>
+                <a:spcPct val="20000"/>
+              </a:spcBef>
+              <a:buFont typeface="Arial"/>
+              <a:buChar char="•"/>
+              <a:defRPr sz="5200" kern="1200">
+                <a:solidFill>
+                  <a:schemeClr val="tx1"/>
+                </a:solidFill>
+                <a:latin typeface="+mn-lt"/>
+                <a:ea typeface="+mn-ea"/>
+                <a:cs typeface="+mn-cs"/>
+              </a:defRPr>
+            </a:lvl7pPr>
+            <a:lvl8pPr marL="11056684" indent="-737112" algn="l" defTabSz="1474225" rtl="0" eaLnBrk="1" latinLnBrk="0" hangingPunct="1">
+              <a:spcBef>
+                <a:spcPct val="20000"/>
+              </a:spcBef>
+              <a:buFont typeface="Arial"/>
+              <a:buChar char="•"/>
+              <a:defRPr sz="5200" kern="1200">
+                <a:solidFill>
+                  <a:schemeClr val="tx1"/>
+                </a:solidFill>
+                <a:latin typeface="+mn-lt"/>
+                <a:ea typeface="+mn-ea"/>
+                <a:cs typeface="+mn-cs"/>
+              </a:defRPr>
+            </a:lvl8pPr>
+            <a:lvl9pPr marL="12530909" indent="-737112" algn="l" defTabSz="1474225" rtl="0" eaLnBrk="1" latinLnBrk="0" hangingPunct="1">
+              <a:spcBef>
+                <a:spcPct val="20000"/>
+              </a:spcBef>
+              <a:buFont typeface="Arial"/>
+              <a:buChar char="•"/>
+              <a:defRPr sz="5200" kern="1200">
+                <a:solidFill>
+                  <a:schemeClr val="tx1"/>
+                </a:solidFill>
+                <a:latin typeface="+mn-lt"/>
+                <a:ea typeface="+mn-ea"/>
+                <a:cs typeface="+mn-cs"/>
+              </a:defRPr>
+            </a:lvl9pPr>
+          </a:lstStyle>
+          <a:p>
+            <a:pPr marL="565150" indent="-565150" defTabSz="2033588" eaLnBrk="1" hangingPunct="1">
+              <a:defRPr/>
+            </a:pPr>
+            <a:r>
+              <a:rPr lang="en-US" altLang="en-US" sz="4800" b="1" dirty="0">
+                <a:solidFill>
+                  <a:srgbClr val="E56914"/>
+                </a:solidFill>
+                <a:effectLst>
+                  <a:outerShdw blurRad="38100" dist="38100" dir="2700000" algn="tl">
+                    <a:srgbClr val="C0C0C0"/>
+                  </a:outerShdw>
+                </a:effectLst>
+                <a:latin typeface="Arial" panose="020B0604020202020204" pitchFamily="34" charset="0"/>
+                <a:cs typeface="Arial" panose="020B0604020202020204" pitchFamily="34" charset="0"/>
+              </a:rPr>
+              <a:t>Goal: </a:t>
+            </a:r>
+            <a:r>
+              <a:rPr lang="en-US" altLang="en-US" sz="4800" dirty="0">
+                <a:effectLst>
+                  <a:outerShdw blurRad="38100" dist="38100" dir="2700000" algn="tl">
+                    <a:srgbClr val="C0C0C0"/>
+                  </a:outerShdw>
+                </a:effectLst>
+                <a:latin typeface="Arial" panose="020B0604020202020204" pitchFamily="34" charset="0"/>
+                <a:cs typeface="Arial" panose="020B0604020202020204" pitchFamily="34" charset="0"/>
+              </a:rPr>
+              <a:t>Modify and tune </a:t>
+            </a:r>
+            <a:r>
+              <a:rPr lang="en-US" altLang="en-US" sz="4800" dirty="0" err="1">
+                <a:effectLst>
+                  <a:outerShdw blurRad="38100" dist="38100" dir="2700000" algn="tl">
+                    <a:srgbClr val="C0C0C0"/>
+                  </a:outerShdw>
+                </a:effectLst>
+                <a:latin typeface="Arial" panose="020B0604020202020204" pitchFamily="34" charset="0"/>
+                <a:cs typeface="Arial" panose="020B0604020202020204" pitchFamily="34" charset="0"/>
+              </a:rPr>
+              <a:t>Pytorch</a:t>
+            </a:r>
+            <a:r>
+              <a:rPr lang="en-US" altLang="en-US" sz="4800" dirty="0">
+                <a:effectLst>
+                  <a:outerShdw blurRad="38100" dist="38100" dir="2700000" algn="tl">
+                    <a:srgbClr val="C0C0C0"/>
+                  </a:outerShdw>
+                </a:effectLst>
+                <a:latin typeface="Arial" panose="020B0604020202020204" pitchFamily="34" charset="0"/>
+                <a:cs typeface="Arial" panose="020B0604020202020204" pitchFamily="34" charset="0"/>
+              </a:rPr>
+              <a:t> DCGAN to try and create many believable fakes</a:t>
+            </a:r>
+          </a:p>
+          <a:p>
+            <a:pPr marL="565150" indent="-565150" defTabSz="2033588" eaLnBrk="1" hangingPunct="1">
+              <a:defRPr/>
+            </a:pPr>
+            <a:r>
+              <a:rPr lang="en-US" altLang="en-US" sz="4800" b="1" dirty="0">
+                <a:solidFill>
+                  <a:srgbClr val="E56914"/>
+                </a:solidFill>
+                <a:effectLst>
+                  <a:outerShdw blurRad="38100" dist="38100" dir="2700000" algn="tl">
+                    <a:srgbClr val="C0C0C0"/>
+                  </a:outerShdw>
+                </a:effectLst>
+                <a:latin typeface="Arial" panose="020B0604020202020204" pitchFamily="34" charset="0"/>
+                <a:cs typeface="Arial" panose="020B0604020202020204" pitchFamily="34" charset="0"/>
+              </a:rPr>
+              <a:t>Outcome: </a:t>
+            </a:r>
+            <a:r>
+              <a:rPr lang="en-US" altLang="en-US" sz="4800" dirty="0">
+                <a:effectLst>
+                  <a:outerShdw blurRad="38100" dist="38100" dir="2700000" algn="tl">
+                    <a:srgbClr val="C0C0C0"/>
+                  </a:outerShdw>
+                </a:effectLst>
+                <a:latin typeface="Arial" panose="020B0604020202020204" pitchFamily="34" charset="0"/>
+                <a:cs typeface="Arial" panose="020B0604020202020204" pitchFamily="34" charset="0"/>
+              </a:rPr>
+              <a:t>Produced small amounts of images much better than baseline. Leap to more believable fakes is much larger </a:t>
+            </a:r>
+            <a:endParaRPr lang="en-US" altLang="en-US" sz="4800" dirty="0">
+              <a:latin typeface="Arial" panose="020B0604020202020204" pitchFamily="34" charset="0"/>
+              <a:cs typeface="Arial" panose="020B0604020202020204" pitchFamily="34" charset="0"/>
+            </a:endParaRPr>
+          </a:p>
+          <a:p>
+            <a:pPr marL="565150" indent="-565150" defTabSz="2033588">
+              <a:defRPr/>
+            </a:pPr>
+            <a:endParaRPr lang="en-US" altLang="en-US" sz="4800" dirty="0">
+              <a:latin typeface="Arial" panose="020B0604020202020204" pitchFamily="34" charset="0"/>
+              <a:cs typeface="Arial" panose="020B0604020202020204" pitchFamily="34" charset="0"/>
+            </a:endParaRPr>
+          </a:p>
+        </p:txBody>
+      </p:sp>
+      <p:pic>
+        <p:nvPicPr>
+          <p:cNvPr id="42" name="Picture 41">
+            <a:extLst>
+              <a:ext uri="{FF2B5EF4-FFF2-40B4-BE49-F238E27FC236}">
+                <a16:creationId xmlns:a16="http://schemas.microsoft.com/office/drawing/2014/main" id="{4F43BDC5-E64C-2B45-8582-C3670771D5E6}"/>
+              </a:ext>
+            </a:extLst>
+          </p:cNvPr>
+          <p:cNvPicPr/>
+          <p:nvPr/>
+        </p:nvPicPr>
+        <p:blipFill rotWithShape="1">
+          <a:blip r:embed="rId16" cstate="print">
+            <a:extLst>
+              <a:ext uri="{28A0092B-C50C-407E-A947-70E740481C1C}">
+                <a14:useLocalDpi xmlns:a14="http://schemas.microsoft.com/office/drawing/2010/main" val="0"/>
+              </a:ext>
+            </a:extLst>
+          </a:blip>
+          <a:srcRect l="4133" t="12457" r="5135" b="3966"/>
+          <a:stretch/>
+        </p:blipFill>
+        <p:spPr bwMode="auto">
+          <a:xfrm>
+            <a:off x="5303020" y="12699776"/>
+            <a:ext cx="9173395" cy="3101776"/>
+          </a:xfrm>
+          <a:prstGeom prst="rect">
+            <a:avLst/>
+          </a:prstGeom>
+          <a:ln>
+            <a:noFill/>
+          </a:ln>
+          <a:extLst>
+            <a:ext uri="{53640926-AAD7-44D8-BBD7-CCE9431645EC}">
+              <a14:shadowObscured xmlns:a14="http://schemas.microsoft.com/office/drawing/2010/main"/>
+            </a:ext>
+          </a:extLst>
+        </p:spPr>
+      </p:pic>
+      <p:sp>
+        <p:nvSpPr>
+          <p:cNvPr id="13" name="TextBox 12">
+            <a:extLst>
+              <a:ext uri="{FF2B5EF4-FFF2-40B4-BE49-F238E27FC236}">
+                <a16:creationId xmlns:a16="http://schemas.microsoft.com/office/drawing/2014/main" id="{2185284D-A2FA-774C-80AF-D11419D3CCCD}"/>
+              </a:ext>
+            </a:extLst>
+          </p:cNvPr>
+          <p:cNvSpPr txBox="1"/>
+          <p:nvPr/>
+        </p:nvSpPr>
+        <p:spPr>
+          <a:xfrm>
+            <a:off x="26680708" y="7597083"/>
+            <a:ext cx="12725278" cy="994439"/>
+          </a:xfrm>
+          <a:prstGeom prst="rect">
+            <a:avLst/>
+          </a:prstGeom>
+          <a:noFill/>
+        </p:spPr>
+        <p:txBody>
+          <a:bodyPr wrap="none" rtlCol="0">
+            <a:spAutoFit/>
+          </a:bodyPr>
+          <a:lstStyle/>
+          <a:p>
+            <a:r>
+              <a:rPr lang="en-US" dirty="0">
+                <a:sym typeface="Wingdings" pitchFamily="2" charset="2"/>
+              </a:rPr>
+              <a:t></a:t>
+            </a:r>
+            <a:r>
+              <a:rPr lang="en-US" dirty="0"/>
+              <a:t> Low Variation: Bioscience Building</a:t>
+            </a:r>
+          </a:p>
+        </p:txBody>
+      </p:sp>
+      <p:sp>
+        <p:nvSpPr>
+          <p:cNvPr id="44" name="TextBox 43">
+            <a:extLst>
+              <a:ext uri="{FF2B5EF4-FFF2-40B4-BE49-F238E27FC236}">
+                <a16:creationId xmlns:a16="http://schemas.microsoft.com/office/drawing/2014/main" id="{1540678C-8083-2045-ADDE-823A386C9777}"/>
+              </a:ext>
+            </a:extLst>
+          </p:cNvPr>
+          <p:cNvSpPr txBox="1"/>
+          <p:nvPr/>
+        </p:nvSpPr>
+        <p:spPr>
+          <a:xfrm>
+            <a:off x="15613706" y="5885883"/>
+            <a:ext cx="12178297" cy="923330"/>
+          </a:xfrm>
+          <a:prstGeom prst="rect">
+            <a:avLst/>
+          </a:prstGeom>
+          <a:noFill/>
+        </p:spPr>
+        <p:txBody>
+          <a:bodyPr wrap="square" rtlCol="0">
+            <a:spAutoFit/>
+          </a:bodyPr>
+          <a:lstStyle/>
+          <a:p>
+            <a:pPr marL="565150" indent="-565150" defTabSz="2033588" eaLnBrk="1" hangingPunct="1">
+              <a:defRPr/>
+            </a:pPr>
+            <a:r>
+              <a:rPr lang="en-US" altLang="en-US" sz="5400" dirty="0">
+                <a:effectLst>
+                  <a:outerShdw blurRad="38100" dist="38100" dir="2700000" algn="tl">
+                    <a:srgbClr val="C0C0C0"/>
+                  </a:outerShdw>
+                </a:effectLst>
+                <a:cs typeface="Arial" panose="020B0604020202020204" pitchFamily="34" charset="0"/>
+              </a:rPr>
+              <a:t>	</a:t>
+            </a:r>
+            <a:r>
+              <a:rPr lang="en-US" altLang="en-US" sz="5400" dirty="0" err="1">
+                <a:effectLst>
+                  <a:outerShdw blurRad="38100" dist="38100" dir="2700000" algn="tl">
+                    <a:srgbClr val="C0C0C0"/>
+                  </a:outerShdw>
+                </a:effectLst>
+                <a:cs typeface="Arial" panose="020B0604020202020204" pitchFamily="34" charset="0"/>
+              </a:rPr>
+              <a:t>Lsun</a:t>
+            </a:r>
+            <a:r>
+              <a:rPr lang="en-US" altLang="en-US" sz="5400" dirty="0">
+                <a:effectLst>
+                  <a:outerShdw blurRad="38100" dist="38100" dir="2700000" algn="tl">
+                    <a:srgbClr val="C0C0C0"/>
+                  </a:outerShdw>
+                </a:effectLst>
+                <a:cs typeface="Arial" panose="020B0604020202020204" pitchFamily="34" charset="0"/>
+              </a:rPr>
+              <a:t> Churches: 75 Epochs </a:t>
+            </a:r>
+            <a:r>
+              <a:rPr lang="en-US" altLang="en-US" sz="5400" dirty="0">
+                <a:effectLst>
+                  <a:outerShdw blurRad="38100" dist="38100" dir="2700000" algn="tl">
+                    <a:srgbClr val="C0C0C0"/>
+                  </a:outerShdw>
+                </a:effectLst>
+                <a:cs typeface="Arial" panose="020B0604020202020204" pitchFamily="34" charset="0"/>
+                <a:sym typeface="Wingdings" pitchFamily="2" charset="2"/>
+              </a:rPr>
+              <a:t></a:t>
+            </a:r>
+            <a:endParaRPr lang="en-US" altLang="en-US" sz="5400" dirty="0">
+              <a:effectLst>
+                <a:outerShdw blurRad="38100" dist="38100" dir="2700000" algn="tl">
+                  <a:srgbClr val="C0C0C0"/>
+                </a:outerShdw>
+              </a:effectLst>
+              <a:cs typeface="Arial" panose="020B0604020202020204" pitchFamily="34" charset="0"/>
+            </a:endParaRPr>
+          </a:p>
+        </p:txBody>
+      </p:sp>
+      <p:sp>
+        <p:nvSpPr>
+          <p:cNvPr id="45" name="TextBox 44">
+            <a:extLst>
+              <a:ext uri="{FF2B5EF4-FFF2-40B4-BE49-F238E27FC236}">
+                <a16:creationId xmlns:a16="http://schemas.microsoft.com/office/drawing/2014/main" id="{4C844762-7A99-E949-9AB0-4D7C9AE531EB}"/>
+              </a:ext>
+            </a:extLst>
+          </p:cNvPr>
+          <p:cNvSpPr txBox="1"/>
+          <p:nvPr/>
+        </p:nvSpPr>
+        <p:spPr>
+          <a:xfrm>
+            <a:off x="16268209" y="9264404"/>
+            <a:ext cx="10385407" cy="1896545"/>
+          </a:xfrm>
+          <a:prstGeom prst="rect">
+            <a:avLst/>
+          </a:prstGeom>
+          <a:noFill/>
+        </p:spPr>
+        <p:txBody>
+          <a:bodyPr wrap="none" rtlCol="0">
+            <a:spAutoFit/>
+          </a:bodyPr>
+          <a:lstStyle/>
+          <a:p>
+            <a:r>
+              <a:rPr lang="en-US" dirty="0"/>
+              <a:t>Large RIT Set: 330 Epochs </a:t>
+            </a:r>
+            <a:r>
+              <a:rPr lang="en-US" dirty="0">
+                <a:sym typeface="Wingdings" pitchFamily="2" charset="2"/>
+              </a:rPr>
+              <a:t></a:t>
+            </a:r>
+            <a:endParaRPr lang="en-US" dirty="0"/>
+          </a:p>
+          <a:p>
+            <a:r>
+              <a:rPr lang="en-US" dirty="0"/>
+              <a:t>	(29,297 Images)</a:t>
+            </a:r>
+          </a:p>
+        </p:txBody>
+      </p:sp>
+      <p:sp>
+        <p:nvSpPr>
+          <p:cNvPr id="14" name="TextBox 13">
+            <a:extLst>
+              <a:ext uri="{FF2B5EF4-FFF2-40B4-BE49-F238E27FC236}">
+                <a16:creationId xmlns:a16="http://schemas.microsoft.com/office/drawing/2014/main" id="{98F7C008-C064-C642-930C-0F35F4CC090F}"/>
+              </a:ext>
+            </a:extLst>
+          </p:cNvPr>
+          <p:cNvSpPr txBox="1"/>
+          <p:nvPr/>
+        </p:nvSpPr>
+        <p:spPr>
+          <a:xfrm>
+            <a:off x="214477" y="20704285"/>
+            <a:ext cx="9829935" cy="994439"/>
+          </a:xfrm>
+          <a:prstGeom prst="rect">
+            <a:avLst/>
+          </a:prstGeom>
+          <a:noFill/>
+        </p:spPr>
+        <p:txBody>
+          <a:bodyPr wrap="none" rtlCol="0">
+            <a:spAutoFit/>
+          </a:bodyPr>
+          <a:lstStyle/>
+          <a:p>
+            <a:r>
+              <a:rPr lang="en-US" dirty="0"/>
+              <a:t>If Even, D(x or G(z)) about .5</a:t>
+            </a:r>
+          </a:p>
+        </p:txBody>
+      </p:sp>
     </p:spTree>
   </p:cSld>
   <p:clrMapOvr>

</xml_diff>